<commit_message>
progress report 9 done + guided waves kicked off
</commit_message>
<xml_diff>
--- a/progress-reports/09-progress_report.pptx
+++ b/progress-reports/09-progress_report.pptx
@@ -244,7 +244,7 @@
           <a:p>
             <a:fld id="{9580ACE4-CB89-4D31-9F52-83BD3D7C42BF}" type="datetimeFigureOut">
               <a:rPr lang="en-GB" smtClean="0"/>
-              <a:t>10/12/2024</a:t>
+              <a:t>13/12/2024</a:t>
             </a:fld>
             <a:endParaRPr lang="en-GB"/>
           </a:p>
@@ -6253,38 +6253,35 @@
             <p:ph idx="1"/>
           </p:nvPr>
         </p:nvSpPr>
-        <p:spPr/>
+        <p:spPr>
+          <a:xfrm>
+            <a:off x="838200" y="1825625"/>
+            <a:ext cx="5257800" cy="4351338"/>
+          </a:xfrm>
+        </p:spPr>
         <p:txBody>
           <a:bodyPr/>
           <a:lstStyle/>
           <a:p>
             <a:r>
               <a:rPr lang="en-US" dirty="0"/>
-              <a:t>Valuable theoretical design guidelines in [1]</a:t>
+              <a:t>Valuable theoretical analysis and guidelines given in [1]</a:t>
             </a:r>
           </a:p>
           <a:p>
             <a:r>
               <a:rPr lang="en-US" dirty="0"/>
-              <a:t>Solution for my project </a:t>
+              <a:t>Antenna Magus</a:t>
             </a:r>
           </a:p>
           <a:p>
             <a:r>
               <a:rPr lang="en-US" dirty="0"/>
-              <a:t>Antenna Magus?</a:t>
-            </a:r>
-          </a:p>
-          <a:p>
-            <a:r>
-              <a:rPr lang="en-US" dirty="0"/>
-              <a:t>Show pictures of the final horn</a:t>
-            </a:r>
-          </a:p>
-          <a:p>
-            <a:r>
-              <a:rPr lang="en-US" dirty="0"/>
-              <a:t>Talk about adaptation of a conical horn to a square waveguide?</a:t>
+              <a:t>Adaptation of a cone to the </a:t>
+            </a:r>
+            <a:r>
+              <a:rPr lang="en-US"/>
+              <a:t>square waveguide</a:t>
             </a:r>
             <a:endParaRPr lang="en-GB" dirty="0"/>
           </a:p>
@@ -6398,8 +6395,8 @@
         </p:blipFill>
         <p:spPr>
           <a:xfrm>
-            <a:off x="7529804" y="3162664"/>
-            <a:ext cx="3823996" cy="2883669"/>
+            <a:off x="5981700" y="1446551"/>
+            <a:ext cx="5257800" cy="3964898"/>
           </a:xfrm>
           <a:prstGeom prst="rect">
             <a:avLst/>

</xml_diff>